<commit_message>
minor edits to DE lecture
</commit_message>
<xml_diff>
--- a/assets/lectures/cbw/2019/RNASeq_MiniLecture_04_03_DifferentialExpression.pptx
+++ b/assets/lectures/cbw/2019/RNASeq_MiniLecture_04_03_DifferentialExpression.pptx
@@ -207,7 +207,7 @@
           <a:p>
             <a:fld id="{827BD9F9-8452-A342-BB1B-28ECF19E2CC5}" type="datetimeFigureOut">
               <a:rPr lang="en-US" smtClean="0"/>
-              <a:t>6/10/19</a:t>
+              <a:t>6/11/19</a:t>
             </a:fld>
             <a:endParaRPr lang="en-US"/>
           </a:p>
@@ -896,14 +896,14 @@
           </a:ln>
           <a:extLst>
             <a:ext uri="{909E8E84-426E-40dd-AFC4-6F175D3DCCD1}">
-              <a14:hiddenFill xmlns:a14="http://schemas.microsoft.com/office/drawing/2010/main" xmlns="">
+              <a14:hiddenFill xmlns="" xmlns:a14="http://schemas.microsoft.com/office/drawing/2010/main">
                 <a:solidFill>
                   <a:srgbClr val="FFFFFF"/>
                 </a:solidFill>
               </a14:hiddenFill>
             </a:ext>
             <a:ext uri="{91240B29-F687-4f45-9708-019B960494DF}">
-              <a14:hiddenLine xmlns:a14="http://schemas.microsoft.com/office/drawing/2010/main" xmlns="" w="9525">
+              <a14:hiddenLine xmlns="" xmlns:a14="http://schemas.microsoft.com/office/drawing/2010/main" w="9525">
                 <a:solidFill>
                   <a:srgbClr val="000000"/>
                 </a:solidFill>
@@ -3659,14 +3659,14 @@
           </a:ln>
           <a:extLst>
             <a:ext uri="{909E8E84-426E-40dd-AFC4-6F175D3DCCD1}">
-              <a14:hiddenFill xmlns:a14="http://schemas.microsoft.com/office/drawing/2010/main" xmlns="">
+              <a14:hiddenFill xmlns="" xmlns:a14="http://schemas.microsoft.com/office/drawing/2010/main">
                 <a:solidFill>
                   <a:srgbClr val="FFFFFF"/>
                 </a:solidFill>
               </a14:hiddenFill>
             </a:ext>
             <a:ext uri="{91240B29-F687-4f45-9708-019B960494DF}">
-              <a14:hiddenLine xmlns:a14="http://schemas.microsoft.com/office/drawing/2010/main" xmlns="" w="9525">
+              <a14:hiddenLine xmlns="" xmlns:a14="http://schemas.microsoft.com/office/drawing/2010/main" w="9525">
                 <a:solidFill>
                   <a:srgbClr val="000000"/>
                 </a:solidFill>
@@ -4533,14 +4533,14 @@
           </a:ln>
           <a:extLst>
             <a:ext uri="{909E8E84-426E-40dd-AFC4-6F175D3DCCD1}">
-              <a14:hiddenFill xmlns:a14="http://schemas.microsoft.com/office/drawing/2010/main" xmlns="">
+              <a14:hiddenFill xmlns="" xmlns:a14="http://schemas.microsoft.com/office/drawing/2010/main">
                 <a:solidFill>
                   <a:srgbClr val="FFFFFF"/>
                 </a:solidFill>
               </a14:hiddenFill>
             </a:ext>
             <a:ext uri="{91240B29-F687-4f45-9708-019B960494DF}">
-              <a14:hiddenLine xmlns:a14="http://schemas.microsoft.com/office/drawing/2010/main" xmlns="" w="9525">
+              <a14:hiddenLine xmlns="" xmlns:a14="http://schemas.microsoft.com/office/drawing/2010/main" w="9525">
                 <a:solidFill>
                   <a:srgbClr val="000000"/>
                 </a:solidFill>
@@ -5533,14 +5533,14 @@
           </a:ln>
           <a:extLst>
             <a:ext uri="{909E8E84-426E-40dd-AFC4-6F175D3DCCD1}">
-              <a14:hiddenFill xmlns="" xmlns:a14="http://schemas.microsoft.com/office/drawing/2010/main">
+              <a14:hiddenFill xmlns:a14="http://schemas.microsoft.com/office/drawing/2010/main" xmlns="">
                 <a:solidFill>
                   <a:srgbClr val="FFFFFF"/>
                 </a:solidFill>
               </a14:hiddenFill>
             </a:ext>
             <a:ext uri="{91240B29-F687-4f45-9708-019B960494DF}">
-              <a14:hiddenLine xmlns="" xmlns:a14="http://schemas.microsoft.com/office/drawing/2010/main" w="9525">
+              <a14:hiddenLine xmlns:a14="http://schemas.microsoft.com/office/drawing/2010/main" xmlns="" w="9525">
                 <a:solidFill>
                   <a:srgbClr val="000000"/>
                 </a:solidFill>
@@ -6021,14 +6021,14 @@
             </a:ln>
             <a:extLst>
               <a:ext uri="{909E8E84-426E-40dd-AFC4-6F175D3DCCD1}">
-                <a14:hiddenFill xmlns="" xmlns:a14="http://schemas.microsoft.com/office/drawing/2010/main">
+                <a14:hiddenFill xmlns:a14="http://schemas.microsoft.com/office/drawing/2010/main" xmlns="">
                   <a:solidFill>
                     <a:srgbClr val="FFFFFF"/>
                   </a:solidFill>
                 </a14:hiddenFill>
               </a:ext>
               <a:ext uri="{91240B29-F687-4f45-9708-019B960494DF}">
-                <a14:hiddenLine xmlns="" xmlns:a14="http://schemas.microsoft.com/office/drawing/2010/main" w="9525">
+                <a14:hiddenLine xmlns:a14="http://schemas.microsoft.com/office/drawing/2010/main" xmlns="" w="9525">
                   <a:solidFill>
                     <a:srgbClr val="000000"/>
                   </a:solidFill>
@@ -6340,14 +6340,14 @@
             </a:ln>
             <a:extLst>
               <a:ext uri="{909E8E84-426E-40dd-AFC4-6F175D3DCCD1}">
-                <a14:hiddenFill xmlns="" xmlns:a14="http://schemas.microsoft.com/office/drawing/2010/main">
+                <a14:hiddenFill xmlns:a14="http://schemas.microsoft.com/office/drawing/2010/main" xmlns="">
                   <a:solidFill>
                     <a:srgbClr val="FFFFFF"/>
                   </a:solidFill>
                 </a14:hiddenFill>
               </a:ext>
               <a:ext uri="{91240B29-F687-4f45-9708-019B960494DF}">
-                <a14:hiddenLine xmlns="" xmlns:a14="http://schemas.microsoft.com/office/drawing/2010/main" w="9525">
+                <a14:hiddenLine xmlns:a14="http://schemas.microsoft.com/office/drawing/2010/main" xmlns="" w="9525">
                   <a:solidFill>
                     <a:srgbClr val="000000"/>
                   </a:solidFill>
@@ -6673,14 +6673,14 @@
             </a:ln>
             <a:extLst>
               <a:ext uri="{909E8E84-426E-40dd-AFC4-6F175D3DCCD1}">
-                <a14:hiddenFill xmlns="" xmlns:a14="http://schemas.microsoft.com/office/drawing/2010/main">
+                <a14:hiddenFill xmlns:a14="http://schemas.microsoft.com/office/drawing/2010/main" xmlns="">
                   <a:solidFill>
                     <a:srgbClr val="FFFFFF"/>
                   </a:solidFill>
                 </a14:hiddenFill>
               </a:ext>
               <a:ext uri="{91240B29-F687-4f45-9708-019B960494DF}">
-                <a14:hiddenLine xmlns="" xmlns:a14="http://schemas.microsoft.com/office/drawing/2010/main" w="9525">
+                <a14:hiddenLine xmlns:a14="http://schemas.microsoft.com/office/drawing/2010/main" xmlns="" w="9525">
                   <a:solidFill>
                     <a:srgbClr val="000000"/>
                   </a:solidFill>
@@ -7006,14 +7006,14 @@
             </a:ln>
             <a:extLst>
               <a:ext uri="{909E8E84-426E-40dd-AFC4-6F175D3DCCD1}">
-                <a14:hiddenFill xmlns="" xmlns:a14="http://schemas.microsoft.com/office/drawing/2010/main">
+                <a14:hiddenFill xmlns:a14="http://schemas.microsoft.com/office/drawing/2010/main" xmlns="">
                   <a:solidFill>
                     <a:srgbClr val="FFFFFF"/>
                   </a:solidFill>
                 </a14:hiddenFill>
               </a:ext>
               <a:ext uri="{91240B29-F687-4f45-9708-019B960494DF}">
-                <a14:hiddenLine xmlns="" xmlns:a14="http://schemas.microsoft.com/office/drawing/2010/main" w="9525">
+                <a14:hiddenLine xmlns:a14="http://schemas.microsoft.com/office/drawing/2010/main" xmlns="" w="9525">
                   <a:solidFill>
                     <a:srgbClr val="000000"/>
                   </a:solidFill>
@@ -7339,14 +7339,14 @@
             </a:ln>
             <a:extLst>
               <a:ext uri="{909E8E84-426E-40dd-AFC4-6F175D3DCCD1}">
-                <a14:hiddenFill xmlns="" xmlns:a14="http://schemas.microsoft.com/office/drawing/2010/main">
+                <a14:hiddenFill xmlns:a14="http://schemas.microsoft.com/office/drawing/2010/main" xmlns="">
                   <a:solidFill>
                     <a:srgbClr val="FFFFFF"/>
                   </a:solidFill>
                 </a14:hiddenFill>
               </a:ext>
               <a:ext uri="{91240B29-F687-4f45-9708-019B960494DF}">
-                <a14:hiddenLine xmlns="" xmlns:a14="http://schemas.microsoft.com/office/drawing/2010/main" w="9525">
+                <a14:hiddenLine xmlns:a14="http://schemas.microsoft.com/office/drawing/2010/main" xmlns="" w="9525">
                   <a:solidFill>
                     <a:srgbClr val="000000"/>
                   </a:solidFill>
@@ -7675,14 +7675,14 @@
             </a:ln>
             <a:extLst>
               <a:ext uri="{909E8E84-426E-40dd-AFC4-6F175D3DCCD1}">
-                <a14:hiddenFill xmlns="" xmlns:a14="http://schemas.microsoft.com/office/drawing/2010/main">
+                <a14:hiddenFill xmlns:a14="http://schemas.microsoft.com/office/drawing/2010/main" xmlns="">
                   <a:solidFill>
                     <a:srgbClr val="FFFFFF"/>
                   </a:solidFill>
                 </a14:hiddenFill>
               </a:ext>
               <a:ext uri="{91240B29-F687-4f45-9708-019B960494DF}">
-                <a14:hiddenLine xmlns="" xmlns:a14="http://schemas.microsoft.com/office/drawing/2010/main" w="9525">
+                <a14:hiddenLine xmlns:a14="http://schemas.microsoft.com/office/drawing/2010/main" xmlns="" w="9525">
                   <a:solidFill>
                     <a:srgbClr val="000000"/>
                   </a:solidFill>
@@ -8704,14 +8704,14 @@
           </a:ln>
           <a:extLst>
             <a:ext uri="{909E8E84-426E-40dd-AFC4-6F175D3DCCD1}">
-              <a14:hiddenFill xmlns="" xmlns:a14="http://schemas.microsoft.com/office/drawing/2010/main">
+              <a14:hiddenFill xmlns:a14="http://schemas.microsoft.com/office/drawing/2010/main" xmlns="">
                 <a:solidFill>
                   <a:srgbClr val="FFFFFF"/>
                 </a:solidFill>
               </a14:hiddenFill>
             </a:ext>
             <a:ext uri="{91240B29-F687-4f45-9708-019B960494DF}">
-              <a14:hiddenLine xmlns="" xmlns:a14="http://schemas.microsoft.com/office/drawing/2010/main" w="9525">
+              <a14:hiddenLine xmlns:a14="http://schemas.microsoft.com/office/drawing/2010/main" xmlns="" w="9525">
                 <a:solidFill>
                   <a:srgbClr val="000000"/>
                 </a:solidFill>
@@ -8969,6 +8969,13 @@
               <a:rPr lang="en-US" dirty="0"/>
               <a:t>What genes/transcripts are being expressed at higher/lower levels in different groups of samples?</a:t>
             </a:r>
+          </a:p>
+          <a:p>
+            <a:pPr lvl="1"/>
+            <a:r>
+              <a:rPr lang="en-US" dirty="0"/>
+              <a:t>Are these differences ‘significant’, accounting for variance/noise?</a:t>
+            </a:r>
             <a:br>
               <a:rPr lang="en-US" dirty="0"/>
             </a:br>
@@ -9039,7 +9046,7 @@
         </p:blipFill>
         <p:spPr>
           <a:xfrm>
-            <a:off x="6352191" y="3197748"/>
+            <a:off x="6352191" y="3276771"/>
             <a:ext cx="5242062" cy="2960223"/>
           </a:xfrm>
           <a:prstGeom prst="rect">

</xml_diff>